<commit_message>
Modified poster and presentation; added completion certificate
</commit_message>
<xml_diff>
--- a/TCR/Presentations/TCR_Synthesis.pptx
+++ b/TCR/Presentations/TCR_Synthesis.pptx
@@ -619,35 +619,35 @@
           <a:p>
             <a:pPr lvl="0"/>
             <a:r>
-              <a:rPr lang="en-US" noProof="0" smtClean="0"/>
+              <a:rPr lang="en-US" noProof="0"/>
               <a:t>Click to edit Master text styles</a:t>
             </a:r>
           </a:p>
           <a:p>
             <a:pPr lvl="1"/>
             <a:r>
-              <a:rPr lang="en-US" noProof="0" smtClean="0"/>
+              <a:rPr lang="en-US" noProof="0"/>
               <a:t>Second level</a:t>
             </a:r>
           </a:p>
           <a:p>
             <a:pPr lvl="2"/>
             <a:r>
-              <a:rPr lang="en-US" noProof="0" smtClean="0"/>
+              <a:rPr lang="en-US" noProof="0"/>
               <a:t>Third level</a:t>
             </a:r>
           </a:p>
           <a:p>
             <a:pPr lvl="3"/>
             <a:r>
-              <a:rPr lang="en-US" noProof="0" smtClean="0"/>
+              <a:rPr lang="en-US" noProof="0"/>
               <a:t>Fourth level</a:t>
             </a:r>
           </a:p>
           <a:p>
             <a:pPr lvl="4"/>
             <a:r>
-              <a:rPr lang="en-US" noProof="0" smtClean="0"/>
+              <a:rPr lang="en-US" noProof="0"/>
               <a:t>Fifth level</a:t>
             </a:r>
           </a:p>
@@ -961,7 +961,7 @@
               <a:buFont typeface="Calibri" pitchFamily="34" charset="0"/>
               <a:buAutoNum type="arabicPeriod"/>
             </a:pPr>
-            <a:endParaRPr lang="en-US" smtClean="0">
+            <a:endParaRPr lang="en-US">
               <a:latin typeface="Arial" pitchFamily="34" charset="0"/>
             </a:endParaRPr>
           </a:p>
@@ -1052,7 +1052,7 @@
               <a:buFont typeface="Calibri" pitchFamily="34" charset="0"/>
               <a:buAutoNum type="arabicPeriod"/>
             </a:pPr>
-            <a:endParaRPr lang="en-US" smtClean="0">
+            <a:endParaRPr lang="en-US">
               <a:latin typeface="Arial" pitchFamily="34" charset="0"/>
             </a:endParaRPr>
           </a:p>
@@ -1112,10 +1112,9 @@
           <a:lstStyle/>
           <a:p>
             <a:r>
-              <a:rPr lang="en-US" smtClean="0"/>
+              <a:rPr lang="en-US"/>
               <a:t>Click to edit Master title style</a:t>
             </a:r>
-            <a:endParaRPr lang="en-US"/>
           </a:p>
         </p:txBody>
       </p:sp>
@@ -1177,10 +1176,9 @@
           </a:lstStyle>
           <a:p>
             <a:r>
-              <a:rPr lang="en-US" smtClean="0"/>
+              <a:rPr lang="en-US"/>
               <a:t>Click to edit Master subtitle style</a:t>
             </a:r>
-            <a:endParaRPr lang="en-US"/>
           </a:p>
         </p:txBody>
       </p:sp>
@@ -1436,13 +1434,6 @@
   <p:clrMapOvr>
     <a:masterClrMapping/>
   </p:clrMapOvr>
-  <p:timing>
-    <p:tnLst>
-      <p:par>
-        <p:cTn id="1" dur="indefinite" restart="never" nodeType="tmRoot"/>
-      </p:par>
-    </p:tnLst>
-  </p:timing>
 </p:sldLayout>
 </file>
 
@@ -1487,10 +1478,9 @@
           <a:lstStyle/>
           <a:p>
             <a:r>
-              <a:rPr lang="en-US" smtClean="0"/>
+              <a:rPr lang="en-US"/>
               <a:t>Click to edit Master title style</a:t>
             </a:r>
-            <a:endParaRPr lang="en-US"/>
           </a:p>
         </p:txBody>
       </p:sp>
@@ -1511,38 +1501,37 @@
           <a:p>
             <a:pPr lvl="0"/>
             <a:r>
-              <a:rPr lang="en-US" smtClean="0"/>
+              <a:rPr lang="en-US"/>
               <a:t>Click to edit Master text styles</a:t>
             </a:r>
           </a:p>
           <a:p>
             <a:pPr lvl="1"/>
             <a:r>
-              <a:rPr lang="en-US" smtClean="0"/>
+              <a:rPr lang="en-US"/>
               <a:t>Second level</a:t>
             </a:r>
           </a:p>
           <a:p>
             <a:pPr lvl="2"/>
             <a:r>
-              <a:rPr lang="en-US" smtClean="0"/>
+              <a:rPr lang="en-US"/>
               <a:t>Third level</a:t>
             </a:r>
           </a:p>
           <a:p>
             <a:pPr lvl="3"/>
             <a:r>
-              <a:rPr lang="en-US" smtClean="0"/>
+              <a:rPr lang="en-US"/>
               <a:t>Fourth level</a:t>
             </a:r>
           </a:p>
           <a:p>
             <a:pPr lvl="4"/>
             <a:r>
-              <a:rPr lang="en-US" smtClean="0"/>
+              <a:rPr lang="en-US"/>
               <a:t>Fifth level</a:t>
             </a:r>
-            <a:endParaRPr lang="en-US"/>
           </a:p>
         </p:txBody>
       </p:sp>
@@ -1691,10 +1680,9 @@
           <a:lstStyle/>
           <a:p>
             <a:r>
-              <a:rPr lang="en-US" smtClean="0"/>
+              <a:rPr lang="en-US"/>
               <a:t>Click to edit Master title style</a:t>
             </a:r>
-            <a:endParaRPr lang="en-US"/>
           </a:p>
         </p:txBody>
       </p:sp>
@@ -1720,38 +1708,37 @@
           <a:p>
             <a:pPr lvl="0"/>
             <a:r>
-              <a:rPr lang="en-US" smtClean="0"/>
+              <a:rPr lang="en-US"/>
               <a:t>Click to edit Master text styles</a:t>
             </a:r>
           </a:p>
           <a:p>
             <a:pPr lvl="1"/>
             <a:r>
-              <a:rPr lang="en-US" smtClean="0"/>
+              <a:rPr lang="en-US"/>
               <a:t>Second level</a:t>
             </a:r>
           </a:p>
           <a:p>
             <a:pPr lvl="2"/>
             <a:r>
-              <a:rPr lang="en-US" smtClean="0"/>
+              <a:rPr lang="en-US"/>
               <a:t>Third level</a:t>
             </a:r>
           </a:p>
           <a:p>
             <a:pPr lvl="3"/>
             <a:r>
-              <a:rPr lang="en-US" smtClean="0"/>
+              <a:rPr lang="en-US"/>
               <a:t>Fourth level</a:t>
             </a:r>
           </a:p>
           <a:p>
             <a:pPr lvl="4"/>
             <a:r>
-              <a:rPr lang="en-US" smtClean="0"/>
+              <a:rPr lang="en-US"/>
               <a:t>Fifth level</a:t>
             </a:r>
-            <a:endParaRPr lang="en-US"/>
           </a:p>
         </p:txBody>
       </p:sp>
@@ -1897,10 +1884,9 @@
           <a:lstStyle/>
           <a:p>
             <a:r>
-              <a:rPr lang="en-US" smtClean="0"/>
+              <a:rPr lang="en-US"/>
               <a:t>Click to edit Master title style</a:t>
             </a:r>
-            <a:endParaRPr lang="en-US"/>
           </a:p>
         </p:txBody>
       </p:sp>
@@ -1962,10 +1948,9 @@
           </a:lstStyle>
           <a:p>
             <a:r>
-              <a:rPr lang="en-US" smtClean="0"/>
+              <a:rPr lang="en-US"/>
               <a:t>Click to edit Master subtitle style</a:t>
             </a:r>
-            <a:endParaRPr lang="en-US"/>
           </a:p>
         </p:txBody>
       </p:sp>
@@ -2015,10 +2000,9 @@
           <a:lstStyle/>
           <a:p>
             <a:r>
-              <a:rPr lang="en-US" smtClean="0"/>
+              <a:rPr lang="en-US"/>
               <a:t>Click to edit Master title style</a:t>
             </a:r>
-            <a:endParaRPr lang="en-US"/>
           </a:p>
         </p:txBody>
       </p:sp>
@@ -2039,38 +2023,37 @@
           <a:p>
             <a:pPr lvl="0"/>
             <a:r>
-              <a:rPr lang="en-US" smtClean="0"/>
+              <a:rPr lang="en-US"/>
               <a:t>Click to edit Master text styles</a:t>
             </a:r>
           </a:p>
           <a:p>
             <a:pPr lvl="1"/>
             <a:r>
-              <a:rPr lang="en-US" smtClean="0"/>
+              <a:rPr lang="en-US"/>
               <a:t>Second level</a:t>
             </a:r>
           </a:p>
           <a:p>
             <a:pPr lvl="2"/>
             <a:r>
-              <a:rPr lang="en-US" smtClean="0"/>
+              <a:rPr lang="en-US"/>
               <a:t>Third level</a:t>
             </a:r>
           </a:p>
           <a:p>
             <a:pPr lvl="3"/>
             <a:r>
-              <a:rPr lang="en-US" smtClean="0"/>
+              <a:rPr lang="en-US"/>
               <a:t>Fourth level</a:t>
             </a:r>
           </a:p>
           <a:p>
             <a:pPr lvl="4"/>
             <a:r>
-              <a:rPr lang="en-US" smtClean="0"/>
+              <a:rPr lang="en-US"/>
               <a:t>Fifth level</a:t>
             </a:r>
-            <a:endParaRPr lang="en-US"/>
           </a:p>
         </p:txBody>
       </p:sp>
@@ -2129,10 +2112,9 @@
           </a:lstStyle>
           <a:p>
             <a:r>
-              <a:rPr lang="en-US" smtClean="0"/>
+              <a:rPr lang="en-US"/>
               <a:t>Click to edit Master title style</a:t>
             </a:r>
-            <a:endParaRPr lang="en-US"/>
           </a:p>
         </p:txBody>
       </p:sp>
@@ -2195,7 +2177,7 @@
           <a:p>
             <a:pPr lvl="0"/>
             <a:r>
-              <a:rPr lang="en-US" smtClean="0"/>
+              <a:rPr lang="en-US"/>
               <a:t>Click to edit Master text styles</a:t>
             </a:r>
           </a:p>
@@ -2247,10 +2229,9 @@
           <a:lstStyle/>
           <a:p>
             <a:r>
-              <a:rPr lang="en-US" smtClean="0"/>
+              <a:rPr lang="en-US"/>
               <a:t>Click to edit Master title style</a:t>
             </a:r>
-            <a:endParaRPr lang="en-US"/>
           </a:p>
         </p:txBody>
       </p:sp>
@@ -2304,38 +2285,37 @@
           <a:p>
             <a:pPr lvl="0"/>
             <a:r>
-              <a:rPr lang="en-US" smtClean="0"/>
+              <a:rPr lang="en-US"/>
               <a:t>Click to edit Master text styles</a:t>
             </a:r>
           </a:p>
           <a:p>
             <a:pPr lvl="1"/>
             <a:r>
-              <a:rPr lang="en-US" smtClean="0"/>
+              <a:rPr lang="en-US"/>
               <a:t>Second level</a:t>
             </a:r>
           </a:p>
           <a:p>
             <a:pPr lvl="2"/>
             <a:r>
-              <a:rPr lang="en-US" smtClean="0"/>
+              <a:rPr lang="en-US"/>
               <a:t>Third level</a:t>
             </a:r>
           </a:p>
           <a:p>
             <a:pPr lvl="3"/>
             <a:r>
-              <a:rPr lang="en-US" smtClean="0"/>
+              <a:rPr lang="en-US"/>
               <a:t>Fourth level</a:t>
             </a:r>
           </a:p>
           <a:p>
             <a:pPr lvl="4"/>
             <a:r>
-              <a:rPr lang="en-US" smtClean="0"/>
+              <a:rPr lang="en-US"/>
               <a:t>Fifth level</a:t>
             </a:r>
-            <a:endParaRPr lang="en-US"/>
           </a:p>
         </p:txBody>
       </p:sp>
@@ -2389,38 +2369,37 @@
           <a:p>
             <a:pPr lvl="0"/>
             <a:r>
-              <a:rPr lang="en-US" smtClean="0"/>
+              <a:rPr lang="en-US"/>
               <a:t>Click to edit Master text styles</a:t>
             </a:r>
           </a:p>
           <a:p>
             <a:pPr lvl="1"/>
             <a:r>
-              <a:rPr lang="en-US" smtClean="0"/>
+              <a:rPr lang="en-US"/>
               <a:t>Second level</a:t>
             </a:r>
           </a:p>
           <a:p>
             <a:pPr lvl="2"/>
             <a:r>
-              <a:rPr lang="en-US" smtClean="0"/>
+              <a:rPr lang="en-US"/>
               <a:t>Third level</a:t>
             </a:r>
           </a:p>
           <a:p>
             <a:pPr lvl="3"/>
             <a:r>
-              <a:rPr lang="en-US" smtClean="0"/>
+              <a:rPr lang="en-US"/>
               <a:t>Fourth level</a:t>
             </a:r>
           </a:p>
           <a:p>
             <a:pPr lvl="4"/>
             <a:r>
-              <a:rPr lang="en-US" smtClean="0"/>
+              <a:rPr lang="en-US"/>
               <a:t>Fifth level</a:t>
             </a:r>
-            <a:endParaRPr lang="en-US"/>
           </a:p>
         </p:txBody>
       </p:sp>
@@ -2479,10 +2458,9 @@
           </a:lstStyle>
           <a:p>
             <a:r>
-              <a:rPr lang="en-US" smtClean="0"/>
+              <a:rPr lang="en-US"/>
               <a:t>Click to edit Master title style</a:t>
             </a:r>
-            <a:endParaRPr lang="en-US"/>
           </a:p>
         </p:txBody>
       </p:sp>
@@ -2545,7 +2523,7 @@
           <a:p>
             <a:pPr lvl="0"/>
             <a:r>
-              <a:rPr lang="en-US" smtClean="0"/>
+              <a:rPr lang="en-US"/>
               <a:t>Click to edit Master text styles</a:t>
             </a:r>
           </a:p>
@@ -2601,38 +2579,37 @@
           <a:p>
             <a:pPr lvl="0"/>
             <a:r>
-              <a:rPr lang="en-US" smtClean="0"/>
+              <a:rPr lang="en-US"/>
               <a:t>Click to edit Master text styles</a:t>
             </a:r>
           </a:p>
           <a:p>
             <a:pPr lvl="1"/>
             <a:r>
-              <a:rPr lang="en-US" smtClean="0"/>
+              <a:rPr lang="en-US"/>
               <a:t>Second level</a:t>
             </a:r>
           </a:p>
           <a:p>
             <a:pPr lvl="2"/>
             <a:r>
-              <a:rPr lang="en-US" smtClean="0"/>
+              <a:rPr lang="en-US"/>
               <a:t>Third level</a:t>
             </a:r>
           </a:p>
           <a:p>
             <a:pPr lvl="3"/>
             <a:r>
-              <a:rPr lang="en-US" smtClean="0"/>
+              <a:rPr lang="en-US"/>
               <a:t>Fourth level</a:t>
             </a:r>
           </a:p>
           <a:p>
             <a:pPr lvl="4"/>
             <a:r>
-              <a:rPr lang="en-US" smtClean="0"/>
+              <a:rPr lang="en-US"/>
               <a:t>Fifth level</a:t>
             </a:r>
-            <a:endParaRPr lang="en-US"/>
           </a:p>
         </p:txBody>
       </p:sp>
@@ -2695,7 +2672,7 @@
           <a:p>
             <a:pPr lvl="0"/>
             <a:r>
-              <a:rPr lang="en-US" smtClean="0"/>
+              <a:rPr lang="en-US"/>
               <a:t>Click to edit Master text styles</a:t>
             </a:r>
           </a:p>
@@ -2751,38 +2728,37 @@
           <a:p>
             <a:pPr lvl="0"/>
             <a:r>
-              <a:rPr lang="en-US" smtClean="0"/>
+              <a:rPr lang="en-US"/>
               <a:t>Click to edit Master text styles</a:t>
             </a:r>
           </a:p>
           <a:p>
             <a:pPr lvl="1"/>
             <a:r>
-              <a:rPr lang="en-US" smtClean="0"/>
+              <a:rPr lang="en-US"/>
               <a:t>Second level</a:t>
             </a:r>
           </a:p>
           <a:p>
             <a:pPr lvl="2"/>
             <a:r>
-              <a:rPr lang="en-US" smtClean="0"/>
+              <a:rPr lang="en-US"/>
               <a:t>Third level</a:t>
             </a:r>
           </a:p>
           <a:p>
             <a:pPr lvl="3"/>
             <a:r>
-              <a:rPr lang="en-US" smtClean="0"/>
+              <a:rPr lang="en-US"/>
               <a:t>Fourth level</a:t>
             </a:r>
           </a:p>
           <a:p>
             <a:pPr lvl="4"/>
             <a:r>
-              <a:rPr lang="en-US" smtClean="0"/>
+              <a:rPr lang="en-US"/>
               <a:t>Fifth level</a:t>
             </a:r>
-            <a:endParaRPr lang="en-US"/>
           </a:p>
         </p:txBody>
       </p:sp>
@@ -2832,10 +2808,9 @@
           <a:lstStyle/>
           <a:p>
             <a:r>
-              <a:rPr lang="en-US" smtClean="0"/>
+              <a:rPr lang="en-US"/>
               <a:t>Click to edit Master title style</a:t>
             </a:r>
-            <a:endParaRPr lang="en-US"/>
           </a:p>
         </p:txBody>
       </p:sp>
@@ -2924,10 +2899,9 @@
           </a:lstStyle>
           <a:p>
             <a:r>
-              <a:rPr lang="en-US" smtClean="0"/>
+              <a:rPr lang="en-US"/>
               <a:t>Click to edit Master title style</a:t>
             </a:r>
-            <a:endParaRPr lang="en-US"/>
           </a:p>
         </p:txBody>
       </p:sp>
@@ -2981,38 +2955,37 @@
           <a:p>
             <a:pPr lvl="0"/>
             <a:r>
-              <a:rPr lang="en-US" smtClean="0"/>
+              <a:rPr lang="en-US"/>
               <a:t>Click to edit Master text styles</a:t>
             </a:r>
           </a:p>
           <a:p>
             <a:pPr lvl="1"/>
             <a:r>
-              <a:rPr lang="en-US" smtClean="0"/>
+              <a:rPr lang="en-US"/>
               <a:t>Second level</a:t>
             </a:r>
           </a:p>
           <a:p>
             <a:pPr lvl="2"/>
             <a:r>
-              <a:rPr lang="en-US" smtClean="0"/>
+              <a:rPr lang="en-US"/>
               <a:t>Third level</a:t>
             </a:r>
           </a:p>
           <a:p>
             <a:pPr lvl="3"/>
             <a:r>
-              <a:rPr lang="en-US" smtClean="0"/>
+              <a:rPr lang="en-US"/>
               <a:t>Fourth level</a:t>
             </a:r>
           </a:p>
           <a:p>
             <a:pPr lvl="4"/>
             <a:r>
-              <a:rPr lang="en-US" smtClean="0"/>
+              <a:rPr lang="en-US"/>
               <a:t>Fifth level</a:t>
             </a:r>
-            <a:endParaRPr lang="en-US"/>
           </a:p>
         </p:txBody>
       </p:sp>
@@ -3075,7 +3048,7 @@
           <a:p>
             <a:pPr lvl="0"/>
             <a:r>
-              <a:rPr lang="en-US" smtClean="0"/>
+              <a:rPr lang="en-US"/>
               <a:t>Click to edit Master text styles</a:t>
             </a:r>
           </a:p>
@@ -3143,10 +3116,9 @@
           </a:lstStyle>
           <a:p>
             <a:r>
-              <a:rPr lang="en-US" dirty="0" smtClean="0"/>
+              <a:rPr lang="en-US" dirty="0"/>
               <a:t>Click to edit Master title style</a:t>
             </a:r>
-            <a:endParaRPr lang="en-US" dirty="0"/>
           </a:p>
         </p:txBody>
       </p:sp>
@@ -3172,38 +3144,37 @@
           <a:p>
             <a:pPr lvl="0"/>
             <a:r>
-              <a:rPr lang="en-US" dirty="0" smtClean="0"/>
+              <a:rPr lang="en-US" dirty="0"/>
               <a:t>Click to edit Master text styles</a:t>
             </a:r>
           </a:p>
           <a:p>
             <a:pPr lvl="1"/>
             <a:r>
-              <a:rPr lang="en-US" dirty="0" smtClean="0"/>
+              <a:rPr lang="en-US" dirty="0"/>
               <a:t>Second level</a:t>
             </a:r>
           </a:p>
           <a:p>
             <a:pPr lvl="2"/>
             <a:r>
-              <a:rPr lang="en-US" dirty="0" smtClean="0"/>
+              <a:rPr lang="en-US" dirty="0"/>
               <a:t>Third level</a:t>
             </a:r>
           </a:p>
           <a:p>
             <a:pPr lvl="3"/>
             <a:r>
-              <a:rPr lang="en-US" dirty="0" smtClean="0"/>
+              <a:rPr lang="en-US" dirty="0"/>
               <a:t>Fourth level</a:t>
             </a:r>
           </a:p>
           <a:p>
             <a:pPr lvl="4"/>
             <a:r>
-              <a:rPr lang="en-US" dirty="0" smtClean="0"/>
+              <a:rPr lang="en-US" dirty="0"/>
               <a:t>Fifth level</a:t>
             </a:r>
-            <a:endParaRPr lang="en-US" dirty="0"/>
           </a:p>
         </p:txBody>
       </p:sp>
@@ -3262,13 +3233,6 @@
   <p:clrMapOvr>
     <a:masterClrMapping/>
   </p:clrMapOvr>
-  <p:timing>
-    <p:tnLst>
-      <p:par>
-        <p:cTn id="1" dur="indefinite" restart="never" nodeType="tmRoot"/>
-      </p:par>
-    </p:tnLst>
-  </p:timing>
 </p:sldLayout>
 </file>
 
@@ -3314,10 +3278,9 @@
           </a:lstStyle>
           <a:p>
             <a:r>
-              <a:rPr lang="en-US" smtClean="0"/>
+              <a:rPr lang="en-US"/>
               <a:t>Click to edit Master title style</a:t>
             </a:r>
-            <a:endParaRPr lang="en-US"/>
           </a:p>
         </p:txBody>
       </p:sp>
@@ -3379,7 +3342,7 @@
           </a:lstStyle>
           <a:p>
             <a:pPr lvl="0"/>
-            <a:endParaRPr lang="en-US" noProof="0" smtClean="0"/>
+            <a:endParaRPr lang="en-US" noProof="0"/>
           </a:p>
         </p:txBody>
       </p:sp>
@@ -3442,7 +3405,7 @@
           <a:p>
             <a:pPr lvl="0"/>
             <a:r>
-              <a:rPr lang="en-US" smtClean="0"/>
+              <a:rPr lang="en-US"/>
               <a:t>Click to edit Master text styles</a:t>
             </a:r>
           </a:p>
@@ -3494,10 +3457,9 @@
           <a:lstStyle/>
           <a:p>
             <a:r>
-              <a:rPr lang="en-US" smtClean="0"/>
+              <a:rPr lang="en-US"/>
               <a:t>Click to edit Master title style</a:t>
             </a:r>
-            <a:endParaRPr lang="en-US"/>
           </a:p>
         </p:txBody>
       </p:sp>
@@ -3518,38 +3480,37 @@
           <a:p>
             <a:pPr lvl="0"/>
             <a:r>
-              <a:rPr lang="en-US" smtClean="0"/>
+              <a:rPr lang="en-US"/>
               <a:t>Click to edit Master text styles</a:t>
             </a:r>
           </a:p>
           <a:p>
             <a:pPr lvl="1"/>
             <a:r>
-              <a:rPr lang="en-US" smtClean="0"/>
+              <a:rPr lang="en-US"/>
               <a:t>Second level</a:t>
             </a:r>
           </a:p>
           <a:p>
             <a:pPr lvl="2"/>
             <a:r>
-              <a:rPr lang="en-US" smtClean="0"/>
+              <a:rPr lang="en-US"/>
               <a:t>Third level</a:t>
             </a:r>
           </a:p>
           <a:p>
             <a:pPr lvl="3"/>
             <a:r>
-              <a:rPr lang="en-US" smtClean="0"/>
+              <a:rPr lang="en-US"/>
               <a:t>Fourth level</a:t>
             </a:r>
           </a:p>
           <a:p>
             <a:pPr lvl="4"/>
             <a:r>
-              <a:rPr lang="en-US" smtClean="0"/>
+              <a:rPr lang="en-US"/>
               <a:t>Fifth level</a:t>
             </a:r>
-            <a:endParaRPr lang="en-US"/>
           </a:p>
         </p:txBody>
       </p:sp>
@@ -3604,10 +3565,9 @@
           <a:lstStyle/>
           <a:p>
             <a:r>
-              <a:rPr lang="en-US" smtClean="0"/>
+              <a:rPr lang="en-US"/>
               <a:t>Click to edit Master title style</a:t>
             </a:r>
-            <a:endParaRPr lang="en-US"/>
           </a:p>
         </p:txBody>
       </p:sp>
@@ -3633,38 +3593,37 @@
           <a:p>
             <a:pPr lvl="0"/>
             <a:r>
-              <a:rPr lang="en-US" smtClean="0"/>
+              <a:rPr lang="en-US"/>
               <a:t>Click to edit Master text styles</a:t>
             </a:r>
           </a:p>
           <a:p>
             <a:pPr lvl="1"/>
             <a:r>
-              <a:rPr lang="en-US" smtClean="0"/>
+              <a:rPr lang="en-US"/>
               <a:t>Second level</a:t>
             </a:r>
           </a:p>
           <a:p>
             <a:pPr lvl="2"/>
             <a:r>
-              <a:rPr lang="en-US" smtClean="0"/>
+              <a:rPr lang="en-US"/>
               <a:t>Third level</a:t>
             </a:r>
           </a:p>
           <a:p>
             <a:pPr lvl="3"/>
             <a:r>
-              <a:rPr lang="en-US" smtClean="0"/>
+              <a:rPr lang="en-US"/>
               <a:t>Fourth level</a:t>
             </a:r>
           </a:p>
           <a:p>
             <a:pPr lvl="4"/>
             <a:r>
-              <a:rPr lang="en-US" smtClean="0"/>
+              <a:rPr lang="en-US"/>
               <a:t>Fifth level</a:t>
             </a:r>
-            <a:endParaRPr lang="en-US"/>
           </a:p>
         </p:txBody>
       </p:sp>
@@ -3726,10 +3685,9 @@
           </a:lstStyle>
           <a:p>
             <a:r>
-              <a:rPr lang="en-US" smtClean="0"/>
+              <a:rPr lang="en-US"/>
               <a:t>Click to edit Master title style</a:t>
             </a:r>
-            <a:endParaRPr lang="en-US"/>
           </a:p>
         </p:txBody>
       </p:sp>
@@ -3792,7 +3750,7 @@
           <a:p>
             <a:pPr lvl="0"/>
             <a:r>
-              <a:rPr lang="en-US" smtClean="0"/>
+              <a:rPr lang="en-US"/>
               <a:t>Click to edit Master text styles</a:t>
             </a:r>
           </a:p>
@@ -3899,13 +3857,6 @@
   <p:clrMapOvr>
     <a:masterClrMapping/>
   </p:clrMapOvr>
-  <p:timing>
-    <p:tnLst>
-      <p:par>
-        <p:cTn id="1" dur="indefinite" restart="never" nodeType="tmRoot"/>
-      </p:par>
-    </p:tnLst>
-  </p:timing>
 </p:sldLayout>
 </file>
 
@@ -3950,10 +3901,9 @@
           <a:lstStyle/>
           <a:p>
             <a:r>
-              <a:rPr lang="en-US" smtClean="0"/>
+              <a:rPr lang="en-US"/>
               <a:t>Click to edit Master title style</a:t>
             </a:r>
-            <a:endParaRPr lang="en-US"/>
           </a:p>
         </p:txBody>
       </p:sp>
@@ -4007,38 +3957,37 @@
           <a:p>
             <a:pPr lvl="0"/>
             <a:r>
-              <a:rPr lang="en-US" smtClean="0"/>
+              <a:rPr lang="en-US"/>
               <a:t>Click to edit Master text styles</a:t>
             </a:r>
           </a:p>
           <a:p>
             <a:pPr lvl="1"/>
             <a:r>
-              <a:rPr lang="en-US" smtClean="0"/>
+              <a:rPr lang="en-US"/>
               <a:t>Second level</a:t>
             </a:r>
           </a:p>
           <a:p>
             <a:pPr lvl="2"/>
             <a:r>
-              <a:rPr lang="en-US" smtClean="0"/>
+              <a:rPr lang="en-US"/>
               <a:t>Third level</a:t>
             </a:r>
           </a:p>
           <a:p>
             <a:pPr lvl="3"/>
             <a:r>
-              <a:rPr lang="en-US" smtClean="0"/>
+              <a:rPr lang="en-US"/>
               <a:t>Fourth level</a:t>
             </a:r>
           </a:p>
           <a:p>
             <a:pPr lvl="4"/>
             <a:r>
-              <a:rPr lang="en-US" smtClean="0"/>
+              <a:rPr lang="en-US"/>
               <a:t>Fifth level</a:t>
             </a:r>
-            <a:endParaRPr lang="en-US"/>
           </a:p>
         </p:txBody>
       </p:sp>
@@ -4092,38 +4041,37 @@
           <a:p>
             <a:pPr lvl="0"/>
             <a:r>
-              <a:rPr lang="en-US" smtClean="0"/>
+              <a:rPr lang="en-US"/>
               <a:t>Click to edit Master text styles</a:t>
             </a:r>
           </a:p>
           <a:p>
             <a:pPr lvl="1"/>
             <a:r>
-              <a:rPr lang="en-US" smtClean="0"/>
+              <a:rPr lang="en-US"/>
               <a:t>Second level</a:t>
             </a:r>
           </a:p>
           <a:p>
             <a:pPr lvl="2"/>
             <a:r>
-              <a:rPr lang="en-US" smtClean="0"/>
+              <a:rPr lang="en-US"/>
               <a:t>Third level</a:t>
             </a:r>
           </a:p>
           <a:p>
             <a:pPr lvl="3"/>
             <a:r>
-              <a:rPr lang="en-US" smtClean="0"/>
+              <a:rPr lang="en-US"/>
               <a:t>Fourth level</a:t>
             </a:r>
           </a:p>
           <a:p>
             <a:pPr lvl="4"/>
             <a:r>
-              <a:rPr lang="en-US" smtClean="0"/>
+              <a:rPr lang="en-US"/>
               <a:t>Fifth level</a:t>
             </a:r>
-            <a:endParaRPr lang="en-US"/>
           </a:p>
         </p:txBody>
       </p:sp>
@@ -4228,13 +4176,6 @@
   <p:clrMapOvr>
     <a:masterClrMapping/>
   </p:clrMapOvr>
-  <p:timing>
-    <p:tnLst>
-      <p:par>
-        <p:cTn id="1" dur="indefinite" restart="never" nodeType="tmRoot"/>
-      </p:par>
-    </p:tnLst>
-  </p:timing>
 </p:sldLayout>
 </file>
 
@@ -4283,10 +4224,9 @@
           </a:lstStyle>
           <a:p>
             <a:r>
-              <a:rPr lang="en-US" smtClean="0"/>
+              <a:rPr lang="en-US"/>
               <a:t>Click to edit Master title style</a:t>
             </a:r>
-            <a:endParaRPr lang="en-US"/>
           </a:p>
         </p:txBody>
       </p:sp>
@@ -4349,7 +4289,7 @@
           <a:p>
             <a:pPr lvl="0"/>
             <a:r>
-              <a:rPr lang="en-US" smtClean="0"/>
+              <a:rPr lang="en-US"/>
               <a:t>Click to edit Master text styles</a:t>
             </a:r>
           </a:p>
@@ -4405,38 +4345,37 @@
           <a:p>
             <a:pPr lvl="0"/>
             <a:r>
-              <a:rPr lang="en-US" smtClean="0"/>
+              <a:rPr lang="en-US"/>
               <a:t>Click to edit Master text styles</a:t>
             </a:r>
           </a:p>
           <a:p>
             <a:pPr lvl="1"/>
             <a:r>
-              <a:rPr lang="en-US" smtClean="0"/>
+              <a:rPr lang="en-US"/>
               <a:t>Second level</a:t>
             </a:r>
           </a:p>
           <a:p>
             <a:pPr lvl="2"/>
             <a:r>
-              <a:rPr lang="en-US" smtClean="0"/>
+              <a:rPr lang="en-US"/>
               <a:t>Third level</a:t>
             </a:r>
           </a:p>
           <a:p>
             <a:pPr lvl="3"/>
             <a:r>
-              <a:rPr lang="en-US" smtClean="0"/>
+              <a:rPr lang="en-US"/>
               <a:t>Fourth level</a:t>
             </a:r>
           </a:p>
           <a:p>
             <a:pPr lvl="4"/>
             <a:r>
-              <a:rPr lang="en-US" smtClean="0"/>
+              <a:rPr lang="en-US"/>
               <a:t>Fifth level</a:t>
             </a:r>
-            <a:endParaRPr lang="en-US"/>
           </a:p>
         </p:txBody>
       </p:sp>
@@ -4499,7 +4438,7 @@
           <a:p>
             <a:pPr lvl="0"/>
             <a:r>
-              <a:rPr lang="en-US" smtClean="0"/>
+              <a:rPr lang="en-US"/>
               <a:t>Click to edit Master text styles</a:t>
             </a:r>
           </a:p>
@@ -4555,38 +4494,37 @@
           <a:p>
             <a:pPr lvl="0"/>
             <a:r>
-              <a:rPr lang="en-US" smtClean="0"/>
+              <a:rPr lang="en-US"/>
               <a:t>Click to edit Master text styles</a:t>
             </a:r>
           </a:p>
           <a:p>
             <a:pPr lvl="1"/>
             <a:r>
-              <a:rPr lang="en-US" smtClean="0"/>
+              <a:rPr lang="en-US"/>
               <a:t>Second level</a:t>
             </a:r>
           </a:p>
           <a:p>
             <a:pPr lvl="2"/>
             <a:r>
-              <a:rPr lang="en-US" smtClean="0"/>
+              <a:rPr lang="en-US"/>
               <a:t>Third level</a:t>
             </a:r>
           </a:p>
           <a:p>
             <a:pPr lvl="3"/>
             <a:r>
-              <a:rPr lang="en-US" smtClean="0"/>
+              <a:rPr lang="en-US"/>
               <a:t>Fourth level</a:t>
             </a:r>
           </a:p>
           <a:p>
             <a:pPr lvl="4"/>
             <a:r>
-              <a:rPr lang="en-US" smtClean="0"/>
+              <a:rPr lang="en-US"/>
               <a:t>Fifth level</a:t>
             </a:r>
-            <a:endParaRPr lang="en-US"/>
           </a:p>
         </p:txBody>
       </p:sp>
@@ -4691,13 +4629,6 @@
   <p:clrMapOvr>
     <a:masterClrMapping/>
   </p:clrMapOvr>
-  <p:timing>
-    <p:tnLst>
-      <p:par>
-        <p:cTn id="1" dur="indefinite" restart="never" nodeType="tmRoot"/>
-      </p:par>
-    </p:tnLst>
-  </p:timing>
 </p:sldLayout>
 </file>
 
@@ -4742,10 +4673,9 @@
           <a:lstStyle/>
           <a:p>
             <a:r>
-              <a:rPr lang="en-US" smtClean="0"/>
+              <a:rPr lang="en-US"/>
               <a:t>Click to edit Master title style</a:t>
             </a:r>
-            <a:endParaRPr lang="en-US"/>
           </a:p>
         </p:txBody>
       </p:sp>
@@ -4844,13 +4774,6 @@
   <p:clrMapOvr>
     <a:masterClrMapping/>
   </p:clrMapOvr>
-  <p:timing>
-    <p:tnLst>
-      <p:par>
-        <p:cTn id="1" dur="indefinite" restart="never" nodeType="tmRoot"/>
-      </p:par>
-    </p:tnLst>
-  </p:timing>
 </p:sldLayout>
 </file>
 
@@ -4972,13 +4895,6 @@
   <p:clrMapOvr>
     <a:masterClrMapping/>
   </p:clrMapOvr>
-  <p:timing>
-    <p:tnLst>
-      <p:par>
-        <p:cTn id="1" dur="indefinite" restart="never" nodeType="tmRoot"/>
-      </p:par>
-    </p:tnLst>
-  </p:timing>
 </p:sldLayout>
 </file>
 
@@ -5027,10 +4943,9 @@
           </a:lstStyle>
           <a:p>
             <a:r>
-              <a:rPr lang="en-US" smtClean="0"/>
+              <a:rPr lang="en-US"/>
               <a:t>Click to edit Master title style</a:t>
             </a:r>
-            <a:endParaRPr lang="en-US"/>
           </a:p>
         </p:txBody>
       </p:sp>
@@ -5084,38 +4999,37 @@
           <a:p>
             <a:pPr lvl="0"/>
             <a:r>
-              <a:rPr lang="en-US" smtClean="0"/>
+              <a:rPr lang="en-US"/>
               <a:t>Click to edit Master text styles</a:t>
             </a:r>
           </a:p>
           <a:p>
             <a:pPr lvl="1"/>
             <a:r>
-              <a:rPr lang="en-US" smtClean="0"/>
+              <a:rPr lang="en-US"/>
               <a:t>Second level</a:t>
             </a:r>
           </a:p>
           <a:p>
             <a:pPr lvl="2"/>
             <a:r>
-              <a:rPr lang="en-US" smtClean="0"/>
+              <a:rPr lang="en-US"/>
               <a:t>Third level</a:t>
             </a:r>
           </a:p>
           <a:p>
             <a:pPr lvl="3"/>
             <a:r>
-              <a:rPr lang="en-US" smtClean="0"/>
+              <a:rPr lang="en-US"/>
               <a:t>Fourth level</a:t>
             </a:r>
           </a:p>
           <a:p>
             <a:pPr lvl="4"/>
             <a:r>
-              <a:rPr lang="en-US" smtClean="0"/>
+              <a:rPr lang="en-US"/>
               <a:t>Fifth level</a:t>
             </a:r>
-            <a:endParaRPr lang="en-US"/>
           </a:p>
         </p:txBody>
       </p:sp>
@@ -5178,7 +5092,7 @@
           <a:p>
             <a:pPr lvl="0"/>
             <a:r>
-              <a:rPr lang="en-US" smtClean="0"/>
+              <a:rPr lang="en-US"/>
               <a:t>Click to edit Master text styles</a:t>
             </a:r>
           </a:p>
@@ -5333,10 +5247,9 @@
           </a:lstStyle>
           <a:p>
             <a:r>
-              <a:rPr lang="en-US" smtClean="0"/>
+              <a:rPr lang="en-US"/>
               <a:t>Click to edit Master title style</a:t>
             </a:r>
-            <a:endParaRPr lang="en-US"/>
           </a:p>
         </p:txBody>
       </p:sp>
@@ -5398,7 +5311,7 @@
           </a:lstStyle>
           <a:p>
             <a:pPr lvl="0"/>
-            <a:endParaRPr lang="en-US" noProof="0" smtClean="0"/>
+            <a:endParaRPr lang="en-US" noProof="0"/>
           </a:p>
         </p:txBody>
       </p:sp>
@@ -5461,7 +5374,7 @@
           <a:p>
             <a:pPr lvl="0"/>
             <a:r>
-              <a:rPr lang="en-US" smtClean="0"/>
+              <a:rPr lang="en-US"/>
               <a:t>Click to edit Master text styles</a:t>
             </a:r>
           </a:p>
@@ -5568,13 +5481,6 @@
   <p:clrMapOvr>
     <a:masterClrMapping/>
   </p:clrMapOvr>
-  <p:timing>
-    <p:tnLst>
-      <p:par>
-        <p:cTn id="1" dur="indefinite" restart="never" nodeType="tmRoot"/>
-      </p:par>
-    </p:tnLst>
-  </p:timing>
 </p:sldLayout>
 </file>
 
@@ -5658,35 +5564,35 @@
           <a:p>
             <a:pPr lvl="0"/>
             <a:r>
-              <a:rPr lang="en-US" smtClean="0"/>
+              <a:rPr lang="en-US"/>
               <a:t>Click to edit Master text styles</a:t>
             </a:r>
           </a:p>
           <a:p>
             <a:pPr lvl="1"/>
             <a:r>
-              <a:rPr lang="en-US" smtClean="0"/>
+              <a:rPr lang="en-US"/>
               <a:t>Second level</a:t>
             </a:r>
           </a:p>
           <a:p>
             <a:pPr lvl="2"/>
             <a:r>
-              <a:rPr lang="en-US" smtClean="0"/>
+              <a:rPr lang="en-US"/>
               <a:t>Third level</a:t>
             </a:r>
           </a:p>
           <a:p>
             <a:pPr lvl="3"/>
             <a:r>
-              <a:rPr lang="en-US" smtClean="0"/>
+              <a:rPr lang="en-US"/>
               <a:t>Fourth level</a:t>
             </a:r>
           </a:p>
           <a:p>
             <a:pPr lvl="4"/>
             <a:r>
-              <a:rPr lang="en-US" smtClean="0"/>
+              <a:rPr lang="en-US"/>
               <a:t>Fifth level</a:t>
             </a:r>
           </a:p>
@@ -5919,7 +5825,6 @@
             <a:noFill/>
           </a:ln>
           <a:effectLst/>
-          <a:extLst/>
         </p:spPr>
         <p:txBody>
           <a:bodyPr wrap="none" anchor="ctr"/>
@@ -6059,13 +5964,6 @@
     <p:sldLayoutId id="2147483704" r:id="rId10"/>
     <p:sldLayoutId id="2147483705" r:id="rId11"/>
   </p:sldLayoutIdLst>
-  <p:timing>
-    <p:tnLst>
-      <p:par>
-        <p:cTn id="1" dur="indefinite" restart="never" nodeType="tmRoot"/>
-      </p:par>
-    </p:tnLst>
-  </p:timing>
   <p:hf hdr="0" ftr="0" dt="0"/>
   <p:txStyles>
     <p:titleStyle>
@@ -6516,7 +6414,7 @@
           <a:p>
             <a:pPr lvl="0"/>
             <a:r>
-              <a:rPr lang="en-US" smtClean="0"/>
+              <a:rPr lang="en-US"/>
               <a:t>Click to edit Master title style</a:t>
             </a:r>
           </a:p>
@@ -6574,35 +6472,35 @@
           <a:p>
             <a:pPr lvl="0"/>
             <a:r>
-              <a:rPr lang="en-US" smtClean="0"/>
+              <a:rPr lang="en-US"/>
               <a:t>Click to edit Master text styles</a:t>
             </a:r>
           </a:p>
           <a:p>
             <a:pPr lvl="1"/>
             <a:r>
-              <a:rPr lang="en-US" smtClean="0"/>
+              <a:rPr lang="en-US"/>
               <a:t>Second level</a:t>
             </a:r>
           </a:p>
           <a:p>
             <a:pPr lvl="2"/>
             <a:r>
-              <a:rPr lang="en-US" smtClean="0"/>
+              <a:rPr lang="en-US"/>
               <a:t>Third level</a:t>
             </a:r>
           </a:p>
           <a:p>
             <a:pPr lvl="3"/>
             <a:r>
-              <a:rPr lang="en-US" smtClean="0"/>
+              <a:rPr lang="en-US"/>
               <a:t>Fourth level</a:t>
             </a:r>
           </a:p>
           <a:p>
             <a:pPr lvl="4"/>
             <a:r>
-              <a:rPr lang="en-US" smtClean="0"/>
+              <a:rPr lang="en-US"/>
               <a:t>Fifth level</a:t>
             </a:r>
           </a:p>
@@ -6809,7 +6707,7 @@
               <a:defRPr/>
             </a:pPr>
             <a:r>
-              <a:rPr lang="en-US" sz="1200" b="1" smtClean="0">
+              <a:rPr lang="en-US" sz="1200" b="1">
                 <a:solidFill>
                   <a:schemeClr val="bg1"/>
                 </a:solidFill>
@@ -7438,20 +7336,13 @@
           </a:lstStyle>
           <a:p>
             <a:r>
-              <a:rPr lang="en-US" sz="3700" kern="0" dirty="0" smtClean="0">
+              <a:rPr lang="en-US" sz="3700" kern="0" dirty="0">
                 <a:solidFill>
                   <a:schemeClr val="tx1"/>
                 </a:solidFill>
               </a:rPr>
               <a:t>TCRβ Repertoire Modeling Using a GPU-Based In-Silico DNA Recombination Algorithm</a:t>
             </a:r>
-          </a:p>
-          <a:p>
-            <a:endParaRPr lang="en-US" sz="3700" kern="0" dirty="0" smtClean="0">
-              <a:solidFill>
-                <a:schemeClr val="tx1"/>
-              </a:solidFill>
-            </a:endParaRPr>
           </a:p>
           <a:p>
             <a:endParaRPr lang="en-US" sz="3700" kern="0" dirty="0">
@@ -7461,13 +7352,6 @@
             </a:endParaRPr>
           </a:p>
           <a:p>
-            <a:endParaRPr lang="en-US" sz="3700" kern="0" dirty="0" smtClean="0">
-              <a:solidFill>
-                <a:schemeClr val="tx1"/>
-              </a:solidFill>
-            </a:endParaRPr>
-          </a:p>
-          <a:p>
             <a:endParaRPr lang="en-US" sz="3700" kern="0" dirty="0">
               <a:solidFill>
                 <a:schemeClr val="tx1"/>
@@ -7475,8 +7359,22 @@
             </a:endParaRPr>
           </a:p>
           <a:p>
-            <a:r>
-              <a:rPr lang="en-US" b="0" kern="0" dirty="0" smtClean="0">
+            <a:endParaRPr lang="en-US" sz="3700" kern="0" dirty="0">
+              <a:solidFill>
+                <a:schemeClr val="tx1"/>
+              </a:solidFill>
+            </a:endParaRPr>
+          </a:p>
+          <a:p>
+            <a:endParaRPr lang="en-US" sz="3700" kern="0" dirty="0">
+              <a:solidFill>
+                <a:schemeClr val="tx1"/>
+              </a:solidFill>
+            </a:endParaRPr>
+          </a:p>
+          <a:p>
+            <a:r>
+              <a:rPr lang="en-US" b="0" kern="0" dirty="0">
                 <a:solidFill>
                   <a:schemeClr val="tx1"/>
                 </a:solidFill>
@@ -7486,7 +7384,7 @@
           </a:p>
           <a:p>
             <a:r>
-              <a:rPr lang="en-US" b="0" kern="0" dirty="0" smtClean="0">
+              <a:rPr lang="en-US" b="0" kern="0" dirty="0">
                 <a:solidFill>
                   <a:schemeClr val="tx1"/>
                 </a:solidFill>
@@ -7494,7 +7392,7 @@
               <a:t>Department of </a:t>
             </a:r>
             <a:r>
-              <a:rPr lang="en-US" b="0" kern="0" dirty="0" err="1" smtClean="0">
+              <a:rPr lang="en-US" b="0" kern="0" dirty="0" err="1">
                 <a:solidFill>
                   <a:schemeClr val="tx1"/>
                 </a:solidFill>
@@ -7502,7 +7400,7 @@
               <a:t>Immunobiology</a:t>
             </a:r>
             <a:r>
-              <a:rPr lang="en-US" b="0" kern="0" dirty="0" smtClean="0">
+              <a:rPr lang="en-US" b="0" kern="0" dirty="0">
                 <a:solidFill>
                   <a:schemeClr val="tx1"/>
                 </a:solidFill>
@@ -7512,7 +7410,7 @@
           </a:p>
           <a:p>
             <a:r>
-              <a:rPr lang="en-US" b="0" kern="0" dirty="0" smtClean="0">
+              <a:rPr lang="en-US" b="0" kern="0" dirty="0">
                 <a:solidFill>
                   <a:schemeClr val="tx1"/>
                 </a:solidFill>
@@ -7520,7 +7418,7 @@
               <a:t>(Jeffrey </a:t>
             </a:r>
             <a:r>
-              <a:rPr lang="en-US" b="0" kern="0" dirty="0" err="1" smtClean="0">
+              <a:rPr lang="en-US" b="0" kern="0" dirty="0" err="1">
                 <a:solidFill>
                   <a:schemeClr val="tx1"/>
                 </a:solidFill>
@@ -7528,7 +7426,7 @@
               <a:t>Frelinger</a:t>
             </a:r>
             <a:r>
-              <a:rPr lang="en-US" b="0" kern="0" dirty="0" smtClean="0">
+              <a:rPr lang="en-US" b="0" kern="0" dirty="0">
                 <a:solidFill>
                   <a:schemeClr val="tx1"/>
                 </a:solidFill>
@@ -7536,7 +7434,7 @@
               <a:t>, Adam </a:t>
             </a:r>
             <a:r>
-              <a:rPr lang="en-US" b="0" kern="0" dirty="0" err="1" smtClean="0">
+              <a:rPr lang="en-US" b="0" kern="0" dirty="0" err="1">
                 <a:solidFill>
                   <a:schemeClr val="tx1"/>
                 </a:solidFill>
@@ -7544,7 +7442,7 @@
               <a:t>Buntzman</a:t>
             </a:r>
             <a:r>
-              <a:rPr lang="en-US" b="0" kern="0" dirty="0" smtClean="0">
+              <a:rPr lang="en-US" b="0" kern="0" dirty="0">
                 <a:solidFill>
                   <a:schemeClr val="tx1"/>
                 </a:solidFill>
@@ -7637,19 +7535,19 @@
           <a:lstStyle/>
           <a:p>
             <a:r>
-              <a:rPr lang="en-US" dirty="0" err="1" smtClean="0">
+              <a:rPr lang="en-US" dirty="0" err="1">
                 <a:latin typeface="Tahoma" pitchFamily="34" charset="0"/>
               </a:rPr>
               <a:t>Elnaz</a:t>
             </a:r>
             <a:r>
-              <a:rPr lang="en-US" dirty="0" smtClean="0">
+              <a:rPr lang="en-US" dirty="0">
                 <a:latin typeface="Tahoma" pitchFamily="34" charset="0"/>
               </a:rPr>
               <a:t> T. </a:t>
             </a:r>
             <a:r>
-              <a:rPr lang="en-US" dirty="0" err="1" smtClean="0">
+              <a:rPr lang="en-US" dirty="0" err="1">
                 <a:latin typeface="Tahoma" pitchFamily="34" charset="0"/>
               </a:rPr>
               <a:t>Yazdi</a:t>
@@ -7846,13 +7744,6 @@
   <p:clrMapOvr>
     <a:masterClrMapping/>
   </p:clrMapOvr>
-  <p:timing>
-    <p:tnLst>
-      <p:par>
-        <p:cTn id="1" dur="indefinite" restart="never" nodeType="tmRoot"/>
-      </p:par>
-    </p:tnLst>
-  </p:timing>
 </p:sld>
 </file>
 
@@ -8011,13 +7902,6 @@
   <p:clrMapOvr>
     <a:masterClrMapping/>
   </p:clrMapOvr>
-  <p:timing>
-    <p:tnLst>
-      <p:par>
-        <p:cTn id="1" dur="indefinite" restart="never" nodeType="tmRoot"/>
-      </p:par>
-    </p:tnLst>
-  </p:timing>
 </p:sld>
 </file>
 
@@ -8318,13 +8202,6 @@
   <p:clrMapOvr>
     <a:masterClrMapping/>
   </p:clrMapOvr>
-  <p:timing>
-    <p:tnLst>
-      <p:par>
-        <p:cTn id="1" dur="indefinite" restart="never" nodeType="tmRoot"/>
-      </p:par>
-    </p:tnLst>
-  </p:timing>
 </p:sld>
 </file>
 
@@ -8544,7 +8421,7 @@
           </a:lstStyle>
           <a:p>
             <a:r>
-              <a:rPr lang="en-US" kern="0" smtClean="0">
+              <a:rPr lang="en-US" kern="0">
                 <a:solidFill>
                   <a:schemeClr val="tx1"/>
                 </a:solidFill>
@@ -8554,7 +8431,7 @@
               </a:rPr>
               <a:t>Obtaining In-Vivo Sequences</a:t>
             </a:r>
-            <a:endParaRPr lang="en-US" kern="0" dirty="0" smtClean="0">
+            <a:endParaRPr lang="en-US" kern="0" dirty="0">
               <a:solidFill>
                 <a:schemeClr val="tx1"/>
               </a:solidFill>
@@ -10104,13 +9981,6 @@
   <p:clrMapOvr>
     <a:masterClrMapping/>
   </p:clrMapOvr>
-  <p:timing>
-    <p:tnLst>
-      <p:par>
-        <p:cTn id="1" dur="indefinite" restart="never" nodeType="tmRoot"/>
-      </p:par>
-    </p:tnLst>
-  </p:timing>
 </p:sld>
 </file>
 
@@ -10273,7 +10143,7 @@
               <a:pPr eaLnBrk="1" hangingPunct="1"/>
               <a:t>5</a:t>
             </a:fld>
-            <a:endParaRPr lang="en-US" altLang="zh-CN" smtClean="0">
+            <a:endParaRPr lang="en-US" altLang="zh-CN">
               <a:latin typeface="Tahoma" pitchFamily="34" charset="0"/>
             </a:endParaRPr>
           </a:p>
@@ -12487,7 +12357,7 @@
           <a:p>
             <a:pPr eaLnBrk="1" hangingPunct="1"/>
             <a:r>
-              <a:rPr lang="en-US" b="1">
+              <a:rPr lang="en-US" b="1" dirty="0">
                 <a:solidFill>
                   <a:srgbClr val="FF0000"/>
                 </a:solidFill>
@@ -12495,7 +12365,7 @@
               <a:t>A</a:t>
             </a:r>
             <a:r>
-              <a:rPr lang="en-US" b="1">
+              <a:rPr lang="en-US" b="1" dirty="0">
                 <a:solidFill>
                   <a:srgbClr val="00B050"/>
                 </a:solidFill>
@@ -12503,26 +12373,21 @@
               <a:t>C</a:t>
             </a:r>
             <a:r>
-              <a:rPr lang="en-US" b="1">
-                <a:solidFill>
-                  <a:srgbClr val="FF0000"/>
-                </a:solidFill>
-              </a:rPr>
-              <a:t>A</a:t>
-            </a:r>
-            <a:r>
-              <a:rPr lang="en-US" b="1">
+              <a:rPr lang="en-US" b="1" dirty="0">
                 <a:solidFill>
                   <a:srgbClr val="FFFF00"/>
                 </a:solidFill>
               </a:rPr>
               <a:t>G</a:t>
             </a:r>
-            <a:endParaRPr lang="en-US" b="1">
-              <a:solidFill>
-                <a:srgbClr val="00B050"/>
-              </a:solidFill>
-            </a:endParaRPr>
+            <a:r>
+              <a:rPr lang="en-US" b="1" dirty="0">
+                <a:solidFill>
+                  <a:srgbClr val="6699FF"/>
+                </a:solidFill>
+              </a:rPr>
+              <a:t>T</a:t>
+            </a:r>
           </a:p>
         </p:txBody>
       </p:sp>
@@ -13541,7 +13406,9 @@
       <p:cxnSp>
         <p:nvCxnSpPr>
           <p:cNvPr id="40" name="Straight Arrow Connector 39"/>
-          <p:cNvCxnSpPr/>
+          <p:cNvCxnSpPr>
+            <a:cxnSpLocks/>
+          </p:cNvCxnSpPr>
           <p:nvPr/>
         </p:nvCxnSpPr>
         <p:spPr>
@@ -14186,14 +14053,14 @@
           <a:lstStyle/>
           <a:p>
             <a:r>
-              <a:rPr lang="en-US" sz="3200" dirty="0" smtClean="0">
+              <a:rPr lang="en-US" sz="3200" dirty="0">
                 <a:solidFill>
                   <a:schemeClr val="bg1"/>
                 </a:solidFill>
               </a:rPr>
               <a:t>DNA Recombination</a:t>
             </a:r>
-            <a:endParaRPr lang="en-AU" sz="3200" dirty="0" smtClean="0">
+            <a:endParaRPr lang="en-AU" sz="3200" dirty="0">
               <a:solidFill>
                 <a:schemeClr val="bg1"/>
               </a:solidFill>
@@ -15591,13 +15458,6 @@
   <p:clrMapOvr>
     <a:masterClrMapping/>
   </p:clrMapOvr>
-  <p:timing>
-    <p:tnLst>
-      <p:par>
-        <p:cTn id="1" dur="indefinite" restart="never" nodeType="tmRoot"/>
-      </p:par>
-    </p:tnLst>
-  </p:timing>
 </p:sld>
 </file>
 
@@ -15739,13 +15599,6 @@
   <p:clrMapOvr>
     <a:masterClrMapping/>
   </p:clrMapOvr>
-  <p:timing>
-    <p:tnLst>
-      <p:par>
-        <p:cTn id="1" dur="indefinite" restart="never" nodeType="tmRoot"/>
-      </p:par>
-    </p:tnLst>
-  </p:timing>
 </p:sld>
 </file>
 
@@ -15908,7 +15761,7 @@
               <a:pPr eaLnBrk="1" hangingPunct="1"/>
               <a:t>8</a:t>
             </a:fld>
-            <a:endParaRPr lang="en-US" altLang="zh-CN" smtClean="0">
+            <a:endParaRPr lang="en-US" altLang="zh-CN">
               <a:latin typeface="Tahoma" pitchFamily="34" charset="0"/>
             </a:endParaRPr>
           </a:p>
@@ -15935,7 +15788,7 @@
           <a:lstStyle/>
           <a:p>
             <a:r>
-              <a:rPr lang="en-US" sz="2400" smtClean="0">
+              <a:rPr lang="en-US" sz="2400">
                 <a:latin typeface="Calibri" pitchFamily="34" charset="0"/>
                 <a:ea typeface="Calibri" pitchFamily="34" charset="0"/>
                 <a:cs typeface="Calibri" pitchFamily="34" charset="0"/>
@@ -15945,7 +15798,7 @@
           </a:p>
           <a:p>
             <a:r>
-              <a:rPr lang="en-US" sz="2400" smtClean="0">
+              <a:rPr lang="en-US" sz="2400">
                 <a:latin typeface="Calibri" pitchFamily="34" charset="0"/>
                 <a:ea typeface="Calibri" pitchFamily="34" charset="0"/>
                 <a:cs typeface="Calibri" pitchFamily="34" charset="0"/>
@@ -15953,7 +15806,7 @@
               <a:t>Total threads launched is based on length of nucleotide: 4</a:t>
             </a:r>
             <a:r>
-              <a:rPr lang="en-US" sz="2400" baseline="30000" smtClean="0">
+              <a:rPr lang="en-US" sz="2400" baseline="30000">
                 <a:latin typeface="Calibri" pitchFamily="34" charset="0"/>
                 <a:ea typeface="Calibri" pitchFamily="34" charset="0"/>
                 <a:cs typeface="Calibri" pitchFamily="34" charset="0"/>
@@ -15961,7 +15814,7 @@
               <a:t>m</a:t>
             </a:r>
             <a:r>
-              <a:rPr lang="en-US" sz="2400" smtClean="0">
+              <a:rPr lang="en-US" sz="2400">
                 <a:latin typeface="Calibri" pitchFamily="34" charset="0"/>
                 <a:ea typeface="Calibri" pitchFamily="34" charset="0"/>
                 <a:cs typeface="Calibri" pitchFamily="34" charset="0"/>
@@ -15971,7 +15824,7 @@
           </a:p>
           <a:p>
             <a:r>
-              <a:rPr lang="en-US" sz="2400" smtClean="0">
+              <a:rPr lang="en-US" sz="2400">
                 <a:latin typeface="Calibri" pitchFamily="34" charset="0"/>
                 <a:ea typeface="Calibri" pitchFamily="34" charset="0"/>
                 <a:cs typeface="Calibri" pitchFamily="34" charset="0"/>
@@ -16062,14 +15915,14 @@
           <a:lstStyle/>
           <a:p>
             <a:r>
-              <a:rPr lang="en-US" sz="3200" dirty="0" smtClean="0">
+              <a:rPr lang="en-US" sz="3200" dirty="0">
                 <a:solidFill>
                   <a:schemeClr val="bg1"/>
                 </a:solidFill>
               </a:rPr>
               <a:t>DNA Recombination</a:t>
             </a:r>
-            <a:endParaRPr lang="en-AU" sz="3200" dirty="0" smtClean="0">
+            <a:endParaRPr lang="en-AU" sz="3200" dirty="0">
               <a:solidFill>
                 <a:schemeClr val="bg1"/>
               </a:solidFill>
@@ -16223,33 +16076,13 @@
             <a:pPr eaLnBrk="1" hangingPunct="1"/>
             <a:r>
               <a:rPr lang="en-US" dirty="0"/>
-              <a:t>NVIDIA </a:t>
-            </a:r>
-            <a:r>
-              <a:rPr lang="en-US" dirty="0" smtClean="0"/>
-              <a:t>K20X using </a:t>
-            </a:r>
-            <a:r>
-              <a:rPr lang="en-US" dirty="0"/>
-              <a:t>CUDA versus </a:t>
-            </a:r>
-            <a:r>
-              <a:rPr lang="en-US" dirty="0" smtClean="0"/>
-              <a:t>Serial Code </a:t>
-            </a:r>
-            <a:r>
-              <a:rPr lang="en-US" dirty="0"/>
-              <a:t>running on an </a:t>
-            </a:r>
-            <a:r>
-              <a:rPr lang="en-US" dirty="0" smtClean="0"/>
-              <a:t>Xeon 2.83GHz.</a:t>
+              <a:t>NVIDIA K20X using CUDA versus Serial Code running on an Xeon 2.83GHz.</a:t>
             </a:r>
           </a:p>
           <a:p>
             <a:pPr eaLnBrk="1" hangingPunct="1"/>
             <a:r>
-              <a:rPr lang="en-US" b="1" dirty="0" smtClean="0">
+              <a:rPr lang="en-US" b="1" dirty="0">
                 <a:solidFill>
                   <a:srgbClr val="FF0000"/>
                 </a:solidFill>
@@ -16257,28 +16090,12 @@
               <a:t>                                 </a:t>
             </a:r>
             <a:r>
-              <a:rPr lang="en-US" sz="2400" b="1" dirty="0" smtClean="0">
+              <a:rPr lang="en-US" sz="2400" b="1" dirty="0">
                 <a:solidFill>
                   <a:srgbClr val="FF0000"/>
                 </a:solidFill>
               </a:rPr>
-              <a:t>2.34 </a:t>
-            </a:r>
-            <a:r>
-              <a:rPr lang="en-US" sz="2400" b="1" dirty="0">
-                <a:solidFill>
-                  <a:srgbClr val="FF0000"/>
-                </a:solidFill>
-              </a:rPr>
-              <a:t>days vs 260 </a:t>
-            </a:r>
-            <a:r>
-              <a:rPr lang="en-US" sz="2400" b="1" dirty="0" smtClean="0">
-                <a:solidFill>
-                  <a:srgbClr val="FF0000"/>
-                </a:solidFill>
-              </a:rPr>
-              <a:t>weeks</a:t>
+              <a:t>2.34 days vs 260 weeks</a:t>
             </a:r>
             <a:endParaRPr lang="en-US" dirty="0"/>
           </a:p>
@@ -16295,13 +16112,6 @@
     <a:masterClrMapping/>
   </p:clrMapOvr>
   <p:transition spd="slow"/>
-  <p:timing>
-    <p:tnLst>
-      <p:par>
-        <p:cTn id="1" dur="indefinite" restart="never" nodeType="tmRoot"/>
-      </p:par>
-    </p:tnLst>
-  </p:timing>
 </p:sld>
 </file>
 
@@ -16549,13 +16359,6 @@
   <p:clrMapOvr>
     <a:masterClrMapping/>
   </p:clrMapOvr>
-  <p:timing>
-    <p:tnLst>
-      <p:par>
-        <p:cTn id="1" dur="indefinite" restart="never" nodeType="tmRoot"/>
-      </p:par>
-    </p:tnLst>
-  </p:timing>
 </p:sld>
 </file>
 

</xml_diff>